<commit_message>
adds footer with link to materials
</commit_message>
<xml_diff>
--- a/ppt/reproduction-ready.pptx
+++ b/ppt/reproduction-ready.pptx
@@ -1291,6 +1291,69 @@
           </a:p>
         </p:txBody>
       </p:sp>
+      <p:sp>
+        <p:nvSpPr>
+          <p:cNvPr id="4" name="TextBox 3">
+            <a:extLst>
+              <a:ext uri="{FF2B5EF4-FFF2-40B4-BE49-F238E27FC236}">
+                <a16:creationId xmlns:a16="http://schemas.microsoft.com/office/drawing/2014/main" id="{BD2BF6A6-FA76-46B2-D1A6-71C838F9E7AF}"/>
+              </a:ext>
+            </a:extLst>
+          </p:cNvPr>
+          <p:cNvSpPr txBox="1"/>
+          <p:nvPr userDrawn="1"/>
+        </p:nvSpPr>
+        <p:spPr>
+          <a:xfrm>
+            <a:off x="3045989" y="6529230"/>
+            <a:ext cx="6097044" cy="261610"/>
+          </a:xfrm>
+          <a:prstGeom prst="rect">
+            <a:avLst/>
+          </a:prstGeom>
+          <a:noFill/>
+        </p:spPr>
+        <p:txBody>
+          <a:bodyPr wrap="square">
+            <a:spAutoFit/>
+          </a:bodyPr>
+          <a:lstStyle/>
+          <a:p>
+            <a:pPr algn="ctr"/>
+            <a:r>
+              <a:rPr lang="en-US" sz="1100" b="0" i="0" kern="1200" dirty="0" err="1">
+                <a:solidFill>
+                  <a:schemeClr val="bg1"/>
+                </a:solidFill>
+                <a:latin typeface="National 2" charset="0"/>
+                <a:ea typeface="+mn-ea"/>
+                <a:cs typeface="+mn-cs"/>
+              </a:rPr>
+              <a:t>dartgo.org</a:t>
+            </a:r>
+            <a:r>
+              <a:rPr lang="en-US" sz="1100" b="0" i="0" kern="1200" dirty="0">
+                <a:solidFill>
+                  <a:schemeClr val="bg1"/>
+                </a:solidFill>
+                <a:latin typeface="National 2" charset="0"/>
+                <a:ea typeface="+mn-ea"/>
+                <a:cs typeface="+mn-cs"/>
+              </a:rPr>
+              <a:t>/</a:t>
+            </a:r>
+            <a:r>
+              <a:rPr lang="en-US" sz="1100" b="0" i="0" kern="1200" dirty="0">
+                <a:solidFill>
+                  <a:schemeClr val="bg1"/>
+                </a:solidFill>
+                <a:latin typeface="National 2" charset="0"/>
+              </a:rPr>
+              <a:t>reproduction-ready</a:t>
+            </a:r>
+          </a:p>
+        </p:txBody>
+      </p:sp>
     </p:spTree>
     <p:extLst>
       <p:ext uri="{BB962C8B-B14F-4D97-AF65-F5344CB8AC3E}">
@@ -5087,6 +5150,69 @@
           </a:ln>
         </p:spPr>
       </p:pic>
+      <p:sp>
+        <p:nvSpPr>
+          <p:cNvPr id="3" name="TextBox 2">
+            <a:extLst>
+              <a:ext uri="{FF2B5EF4-FFF2-40B4-BE49-F238E27FC236}">
+                <a16:creationId xmlns:a16="http://schemas.microsoft.com/office/drawing/2014/main" id="{02462C83-DB28-BB69-C651-41F6C170A44C}"/>
+              </a:ext>
+            </a:extLst>
+          </p:cNvPr>
+          <p:cNvSpPr txBox="1"/>
+          <p:nvPr userDrawn="1"/>
+        </p:nvSpPr>
+        <p:spPr>
+          <a:xfrm>
+            <a:off x="3045989" y="6529230"/>
+            <a:ext cx="6097044" cy="261610"/>
+          </a:xfrm>
+          <a:prstGeom prst="rect">
+            <a:avLst/>
+          </a:prstGeom>
+          <a:noFill/>
+        </p:spPr>
+        <p:txBody>
+          <a:bodyPr wrap="square">
+            <a:spAutoFit/>
+          </a:bodyPr>
+          <a:lstStyle/>
+          <a:p>
+            <a:pPr algn="ctr"/>
+            <a:r>
+              <a:rPr lang="en-US" sz="1100" b="0" i="0" kern="1200" dirty="0" err="1">
+                <a:solidFill>
+                  <a:schemeClr val="bg1"/>
+                </a:solidFill>
+                <a:latin typeface="National 2" charset="0"/>
+                <a:ea typeface="+mn-ea"/>
+                <a:cs typeface="+mn-cs"/>
+              </a:rPr>
+              <a:t>dartgo.org</a:t>
+            </a:r>
+            <a:r>
+              <a:rPr lang="en-US" sz="1100" b="0" i="0" kern="1200" dirty="0">
+                <a:solidFill>
+                  <a:schemeClr val="bg1"/>
+                </a:solidFill>
+                <a:latin typeface="National 2" charset="0"/>
+                <a:ea typeface="+mn-ea"/>
+                <a:cs typeface="+mn-cs"/>
+              </a:rPr>
+              <a:t>/</a:t>
+            </a:r>
+            <a:r>
+              <a:rPr lang="en-US" sz="1100" b="0" i="0" kern="1200" dirty="0">
+                <a:solidFill>
+                  <a:schemeClr val="bg1"/>
+                </a:solidFill>
+                <a:latin typeface="National 2" charset="0"/>
+              </a:rPr>
+              <a:t>reproduction-ready</a:t>
+            </a:r>
+          </a:p>
+        </p:txBody>
+      </p:sp>
     </p:spTree>
     <p:extLst>
       <p:ext uri="{BB962C8B-B14F-4D97-AF65-F5344CB8AC3E}">
@@ -7390,6 +7516,69 @@
           </a:prstGeom>
         </p:spPr>
       </p:pic>
+      <p:sp>
+        <p:nvSpPr>
+          <p:cNvPr id="3" name="TextBox 2">
+            <a:extLst>
+              <a:ext uri="{FF2B5EF4-FFF2-40B4-BE49-F238E27FC236}">
+                <a16:creationId xmlns:a16="http://schemas.microsoft.com/office/drawing/2014/main" id="{ED8F6F9B-1185-3C48-C835-01E7A1735BA0}"/>
+              </a:ext>
+            </a:extLst>
+          </p:cNvPr>
+          <p:cNvSpPr txBox="1"/>
+          <p:nvPr userDrawn="1"/>
+        </p:nvSpPr>
+        <p:spPr>
+          <a:xfrm>
+            <a:off x="3045989" y="6529230"/>
+            <a:ext cx="6097044" cy="261610"/>
+          </a:xfrm>
+          <a:prstGeom prst="rect">
+            <a:avLst/>
+          </a:prstGeom>
+          <a:noFill/>
+        </p:spPr>
+        <p:txBody>
+          <a:bodyPr wrap="square">
+            <a:spAutoFit/>
+          </a:bodyPr>
+          <a:lstStyle/>
+          <a:p>
+            <a:pPr algn="ctr"/>
+            <a:r>
+              <a:rPr lang="en-US" sz="1100" b="0" i="0" kern="1200" dirty="0" err="1">
+                <a:solidFill>
+                  <a:schemeClr val="bg1"/>
+                </a:solidFill>
+                <a:latin typeface="National 2" charset="0"/>
+                <a:ea typeface="+mn-ea"/>
+                <a:cs typeface="+mn-cs"/>
+              </a:rPr>
+              <a:t>dartgo.org</a:t>
+            </a:r>
+            <a:r>
+              <a:rPr lang="en-US" sz="1100" b="0" i="0" kern="1200" dirty="0">
+                <a:solidFill>
+                  <a:schemeClr val="bg1"/>
+                </a:solidFill>
+                <a:latin typeface="National 2" charset="0"/>
+                <a:ea typeface="+mn-ea"/>
+                <a:cs typeface="+mn-cs"/>
+              </a:rPr>
+              <a:t>/</a:t>
+            </a:r>
+            <a:r>
+              <a:rPr lang="en-US" sz="1100" b="0" i="0" kern="1200" dirty="0">
+                <a:solidFill>
+                  <a:schemeClr val="bg1"/>
+                </a:solidFill>
+                <a:latin typeface="National 2" charset="0"/>
+              </a:rPr>
+              <a:t>reproduction-ready</a:t>
+            </a:r>
+          </a:p>
+        </p:txBody>
+      </p:sp>
     </p:spTree>
     <p:extLst>
       <p:ext uri="{BB962C8B-B14F-4D97-AF65-F5344CB8AC3E}">
@@ -8500,7 +8689,7 @@
         <p:fade/>
       </p:transition>
     </mc:Choice>
-    <mc:Fallback xmlns:ahyp="http://schemas.microsoft.com/office/drawing/2018/hyperlinkcolor" xmlns:p15="http://schemas.microsoft.com/office/powerpoint/2012/main" xmlns:com="http://schemas.openxmlformats.org/drawingml/2006/compatibility" xmlns:pvml="urn:schemas-microsoft-com:office:powerpoint" xmlns:v="urn:schemas-microsoft-com:vml" xmlns:o="urn:schemas-microsoft-com:office:office" xmlns:dgm="http://schemas.openxmlformats.org/drawingml/2006/diagram" xmlns:c="http://schemas.openxmlformats.org/drawingml/2006/chart" xmlns:mv="urn:schemas-microsoft-com:mac:vml" xmlns="">
+    <mc:Fallback xmlns="" xmlns:mv="urn:schemas-microsoft-com:mac:vml" xmlns:c="http://schemas.openxmlformats.org/drawingml/2006/chart" xmlns:dgm="http://schemas.openxmlformats.org/drawingml/2006/diagram" xmlns:o="urn:schemas-microsoft-com:office:office" xmlns:v="urn:schemas-microsoft-com:vml" xmlns:pvml="urn:schemas-microsoft-com:office:powerpoint" xmlns:com="http://schemas.openxmlformats.org/drawingml/2006/compatibility" xmlns:p15="http://schemas.microsoft.com/office/powerpoint/2012/main" xmlns:ahyp="http://schemas.microsoft.com/office/drawing/2018/hyperlinkcolor">
       <p:transition spd="slow">
         <p:fade/>
       </p:transition>
@@ -8838,6 +9027,69 @@
           </a:prstGeom>
         </p:spPr>
       </p:pic>
+      <p:sp>
+        <p:nvSpPr>
+          <p:cNvPr id="3" name="TextBox 2">
+            <a:extLst>
+              <a:ext uri="{FF2B5EF4-FFF2-40B4-BE49-F238E27FC236}">
+                <a16:creationId xmlns:a16="http://schemas.microsoft.com/office/drawing/2014/main" id="{387C6C37-39B4-D62F-6C6E-EC30D40AC0C9}"/>
+              </a:ext>
+            </a:extLst>
+          </p:cNvPr>
+          <p:cNvSpPr txBox="1"/>
+          <p:nvPr userDrawn="1"/>
+        </p:nvSpPr>
+        <p:spPr>
+          <a:xfrm>
+            <a:off x="3045989" y="6529230"/>
+            <a:ext cx="6097044" cy="261610"/>
+          </a:xfrm>
+          <a:prstGeom prst="rect">
+            <a:avLst/>
+          </a:prstGeom>
+          <a:noFill/>
+        </p:spPr>
+        <p:txBody>
+          <a:bodyPr wrap="square">
+            <a:spAutoFit/>
+          </a:bodyPr>
+          <a:lstStyle/>
+          <a:p>
+            <a:pPr algn="ctr"/>
+            <a:r>
+              <a:rPr lang="en-US" sz="1100" b="0" i="0" kern="1200" dirty="0" err="1">
+                <a:solidFill>
+                  <a:schemeClr val="bg1"/>
+                </a:solidFill>
+                <a:latin typeface="National 2" charset="0"/>
+                <a:ea typeface="+mn-ea"/>
+                <a:cs typeface="+mn-cs"/>
+              </a:rPr>
+              <a:t>dartgo.org</a:t>
+            </a:r>
+            <a:r>
+              <a:rPr lang="en-US" sz="1100" b="0" i="0" kern="1200" dirty="0">
+                <a:solidFill>
+                  <a:schemeClr val="bg1"/>
+                </a:solidFill>
+                <a:latin typeface="National 2" charset="0"/>
+                <a:ea typeface="+mn-ea"/>
+                <a:cs typeface="+mn-cs"/>
+              </a:rPr>
+              <a:t>/</a:t>
+            </a:r>
+            <a:r>
+              <a:rPr lang="en-US" sz="1100" b="0" i="0" kern="1200" dirty="0">
+                <a:solidFill>
+                  <a:schemeClr val="bg1"/>
+                </a:solidFill>
+                <a:latin typeface="National 2" charset="0"/>
+              </a:rPr>
+              <a:t>reproduction-ready</a:t>
+            </a:r>
+          </a:p>
+        </p:txBody>
+      </p:sp>
     </p:spTree>
     <p:extLst>
       <p:ext uri="{BB962C8B-B14F-4D97-AF65-F5344CB8AC3E}">
@@ -9493,7 +9745,7 @@
         <p:fade/>
       </p:transition>
     </mc:Choice>
-    <mc:Fallback xmlns:ahyp="http://schemas.microsoft.com/office/drawing/2018/hyperlinkcolor" xmlns:p15="http://schemas.microsoft.com/office/powerpoint/2012/main" xmlns:com="http://schemas.openxmlformats.org/drawingml/2006/compatibility" xmlns:pvml="urn:schemas-microsoft-com:office:powerpoint" xmlns:v="urn:schemas-microsoft-com:vml" xmlns:o="urn:schemas-microsoft-com:office:office" xmlns:dgm="http://schemas.openxmlformats.org/drawingml/2006/diagram" xmlns:c="http://schemas.openxmlformats.org/drawingml/2006/chart" xmlns:mv="urn:schemas-microsoft-com:mac:vml" xmlns="">
+    <mc:Fallback xmlns="" xmlns:mv="urn:schemas-microsoft-com:mac:vml" xmlns:c="http://schemas.openxmlformats.org/drawingml/2006/chart" xmlns:dgm="http://schemas.openxmlformats.org/drawingml/2006/diagram" xmlns:o="urn:schemas-microsoft-com:office:office" xmlns:v="urn:schemas-microsoft-com:vml" xmlns:pvml="urn:schemas-microsoft-com:office:powerpoint" xmlns:com="http://schemas.openxmlformats.org/drawingml/2006/compatibility" xmlns:p15="http://schemas.microsoft.com/office/powerpoint/2012/main" xmlns:ahyp="http://schemas.microsoft.com/office/drawing/2018/hyperlinkcolor">
       <p:transition spd="slow">
         <p:fade/>
       </p:transition>
@@ -11814,10 +12066,9 @@
           <a:p>
             <a:pPr algn="ctr"/>
             <a:r>
-              <a:rPr lang="en-AU"/>
+              <a:rPr lang="en-AU" dirty="0"/>
               <a:t>Reproduction-ready</a:t>
             </a:r>
-            <a:endParaRPr lang="en-AU" dirty="0"/>
           </a:p>
         </p:txBody>
       </p:sp>
@@ -11858,6 +12109,69 @@
               <a:t>‹#›</a:t>
             </a:fld>
             <a:endParaRPr lang="en-AU" dirty="0"/>
+          </a:p>
+        </p:txBody>
+      </p:sp>
+      <p:sp>
+        <p:nvSpPr>
+          <p:cNvPr id="5" name="TextBox 4">
+            <a:extLst>
+              <a:ext uri="{FF2B5EF4-FFF2-40B4-BE49-F238E27FC236}">
+                <a16:creationId xmlns:a16="http://schemas.microsoft.com/office/drawing/2014/main" id="{AE236636-4C55-4E83-3AE4-32871E25AA4A}"/>
+              </a:ext>
+            </a:extLst>
+          </p:cNvPr>
+          <p:cNvSpPr txBox="1"/>
+          <p:nvPr userDrawn="1"/>
+        </p:nvSpPr>
+        <p:spPr>
+          <a:xfrm>
+            <a:off x="3045989" y="6529230"/>
+            <a:ext cx="6097044" cy="261610"/>
+          </a:xfrm>
+          <a:prstGeom prst="rect">
+            <a:avLst/>
+          </a:prstGeom>
+          <a:noFill/>
+        </p:spPr>
+        <p:txBody>
+          <a:bodyPr wrap="square">
+            <a:spAutoFit/>
+          </a:bodyPr>
+          <a:lstStyle/>
+          <a:p>
+            <a:pPr algn="ctr"/>
+            <a:r>
+              <a:rPr lang="en-US" sz="1100" b="0" i="0" kern="1200" dirty="0" err="1">
+                <a:solidFill>
+                  <a:schemeClr val="accent1"/>
+                </a:solidFill>
+                <a:latin typeface="National 2" charset="0"/>
+                <a:ea typeface="+mn-ea"/>
+                <a:cs typeface="+mn-cs"/>
+              </a:rPr>
+              <a:t>dartgo.org</a:t>
+            </a:r>
+            <a:r>
+              <a:rPr lang="en-US" sz="1100" b="0" i="0" kern="1200" dirty="0">
+                <a:solidFill>
+                  <a:schemeClr val="accent1"/>
+                </a:solidFill>
+                <a:latin typeface="National 2" charset="0"/>
+                <a:ea typeface="+mn-ea"/>
+                <a:cs typeface="+mn-cs"/>
+              </a:rPr>
+              <a:t>/</a:t>
+            </a:r>
+            <a:r>
+              <a:rPr lang="en-US" sz="1100" b="0" i="0" kern="1200" dirty="0">
+                <a:solidFill>
+                  <a:schemeClr val="accent1"/>
+                </a:solidFill>
+                <a:latin typeface="National 2" charset="0"/>
+              </a:rPr>
+              <a:t>reproduction-ready</a:t>
+            </a:r>
           </a:p>
         </p:txBody>
       </p:sp>
@@ -12552,7 +12866,7 @@
         <p:fade/>
       </p:transition>
     </mc:Choice>
-    <mc:Fallback xmlns:ahyp="http://schemas.microsoft.com/office/drawing/2018/hyperlinkcolor" xmlns:p15="http://schemas.microsoft.com/office/powerpoint/2012/main" xmlns:com="http://schemas.openxmlformats.org/drawingml/2006/compatibility" xmlns:pvml="urn:schemas-microsoft-com:office:powerpoint" xmlns:v="urn:schemas-microsoft-com:vml" xmlns:o="urn:schemas-microsoft-com:office:office" xmlns:dgm="http://schemas.openxmlformats.org/drawingml/2006/diagram" xmlns:c="http://schemas.openxmlformats.org/drawingml/2006/chart" xmlns:mv="urn:schemas-microsoft-com:mac:vml" xmlns="">
+    <mc:Fallback xmlns="" xmlns:mv="urn:schemas-microsoft-com:mac:vml" xmlns:c="http://schemas.openxmlformats.org/drawingml/2006/chart" xmlns:dgm="http://schemas.openxmlformats.org/drawingml/2006/diagram" xmlns:o="urn:schemas-microsoft-com:office:office" xmlns:v="urn:schemas-microsoft-com:vml" xmlns:pvml="urn:schemas-microsoft-com:office:powerpoint" xmlns:com="http://schemas.openxmlformats.org/drawingml/2006/compatibility" xmlns:p15="http://schemas.microsoft.com/office/powerpoint/2012/main" xmlns:ahyp="http://schemas.microsoft.com/office/drawing/2018/hyperlinkcolor">
       <p:transition spd="slow">
         <p:fade/>
       </p:transition>
@@ -12896,7 +13210,7 @@
         <p:fade/>
       </p:transition>
     </mc:Choice>
-    <mc:Fallback xmlns:ahyp="http://schemas.microsoft.com/office/drawing/2018/hyperlinkcolor" xmlns:p15="http://schemas.microsoft.com/office/powerpoint/2012/main" xmlns:com="http://schemas.openxmlformats.org/drawingml/2006/compatibility" xmlns:pvml="urn:schemas-microsoft-com:office:powerpoint" xmlns:v="urn:schemas-microsoft-com:vml" xmlns:o="urn:schemas-microsoft-com:office:office" xmlns:dgm="http://schemas.openxmlformats.org/drawingml/2006/diagram" xmlns:c="http://schemas.openxmlformats.org/drawingml/2006/chart" xmlns:mv="urn:schemas-microsoft-com:mac:vml" xmlns="">
+    <mc:Fallback xmlns="" xmlns:mv="urn:schemas-microsoft-com:mac:vml" xmlns:c="http://schemas.openxmlformats.org/drawingml/2006/chart" xmlns:dgm="http://schemas.openxmlformats.org/drawingml/2006/diagram" xmlns:o="urn:schemas-microsoft-com:office:office" xmlns:v="urn:schemas-microsoft-com:vml" xmlns:pvml="urn:schemas-microsoft-com:office:powerpoint" xmlns:com="http://schemas.openxmlformats.org/drawingml/2006/compatibility" xmlns:p15="http://schemas.microsoft.com/office/powerpoint/2012/main" xmlns:ahyp="http://schemas.microsoft.com/office/drawing/2018/hyperlinkcolor">
       <p:transition spd="slow">
         <p:fade/>
       </p:transition>
@@ -13273,13 +13587,13 @@
   <p:clrMapOvr>
     <a:masterClrMapping/>
   </p:clrMapOvr>
-  <mc:AlternateContent xmlns:mc="http://schemas.openxmlformats.org/markup-compatibility/2006">
-    <mc:Choice xmlns:p14="http://schemas.microsoft.com/office/powerpoint/2010/main" Requires="p14">
+  <mc:AlternateContent xmlns:mc="http://schemas.openxmlformats.org/markup-compatibility/2006" xmlns:p14="http://schemas.microsoft.com/office/powerpoint/2010/main">
+    <mc:Choice Requires="p14">
       <p:transition spd="med" p14:dur="700">
         <p:fade/>
       </p:transition>
     </mc:Choice>
-    <mc:Fallback>
+    <mc:Fallback xmlns="">
       <p:transition spd="med">
         <p:fade/>
       </p:transition>
@@ -13469,7 +13783,7 @@
         <p:fade/>
       </p:transition>
     </mc:Choice>
-    <mc:Fallback xmlns:ahyp="http://schemas.microsoft.com/office/drawing/2018/hyperlinkcolor" xmlns:p15="http://schemas.microsoft.com/office/powerpoint/2012/main" xmlns:com="http://schemas.openxmlformats.org/drawingml/2006/compatibility" xmlns:pvml="urn:schemas-microsoft-com:office:powerpoint" xmlns:v="urn:schemas-microsoft-com:vml" xmlns:o="urn:schemas-microsoft-com:office:office" xmlns:dgm="http://schemas.openxmlformats.org/drawingml/2006/diagram" xmlns:c="http://schemas.openxmlformats.org/drawingml/2006/chart" xmlns:mv="urn:schemas-microsoft-com:mac:vml" xmlns="">
+    <mc:Fallback xmlns="" xmlns:mv="urn:schemas-microsoft-com:mac:vml" xmlns:c="http://schemas.openxmlformats.org/drawingml/2006/chart" xmlns:dgm="http://schemas.openxmlformats.org/drawingml/2006/diagram" xmlns:o="urn:schemas-microsoft-com:office:office" xmlns:v="urn:schemas-microsoft-com:vml" xmlns:pvml="urn:schemas-microsoft-com:office:powerpoint" xmlns:com="http://schemas.openxmlformats.org/drawingml/2006/compatibility" xmlns:p15="http://schemas.microsoft.com/office/powerpoint/2012/main" xmlns:ahyp="http://schemas.microsoft.com/office/drawing/2018/hyperlinkcolor">
       <p:transition spd="slow">
         <p:fade/>
       </p:transition>
@@ -14238,7 +14552,7 @@
         <p:fade/>
       </p:transition>
     </mc:Choice>
-    <mc:Fallback xmlns:ahyp="http://schemas.microsoft.com/office/drawing/2018/hyperlinkcolor" xmlns:p15="http://schemas.microsoft.com/office/powerpoint/2012/main" xmlns:com="http://schemas.openxmlformats.org/drawingml/2006/compatibility" xmlns:pvml="urn:schemas-microsoft-com:office:powerpoint" xmlns:v="urn:schemas-microsoft-com:vml" xmlns:o="urn:schemas-microsoft-com:office:office" xmlns:dgm="http://schemas.openxmlformats.org/drawingml/2006/diagram" xmlns:c="http://schemas.openxmlformats.org/drawingml/2006/chart" xmlns:mv="urn:schemas-microsoft-com:mac:vml" xmlns="">
+    <mc:Fallback xmlns="" xmlns:mv="urn:schemas-microsoft-com:mac:vml" xmlns:c="http://schemas.openxmlformats.org/drawingml/2006/chart" xmlns:dgm="http://schemas.openxmlformats.org/drawingml/2006/diagram" xmlns:o="urn:schemas-microsoft-com:office:office" xmlns:v="urn:schemas-microsoft-com:vml" xmlns:pvml="urn:schemas-microsoft-com:office:powerpoint" xmlns:com="http://schemas.openxmlformats.org/drawingml/2006/compatibility" xmlns:p15="http://schemas.microsoft.com/office/powerpoint/2012/main" xmlns:ahyp="http://schemas.microsoft.com/office/drawing/2018/hyperlinkcolor">
       <p:transition spd="slow">
         <p:fade/>
       </p:transition>
@@ -14528,7 +14842,7 @@
         <p:fade/>
       </p:transition>
     </mc:Choice>
-    <mc:Fallback xmlns:ahyp="http://schemas.microsoft.com/office/drawing/2018/hyperlinkcolor" xmlns:p15="http://schemas.microsoft.com/office/powerpoint/2012/main" xmlns:com="http://schemas.openxmlformats.org/drawingml/2006/compatibility" xmlns:pvml="urn:schemas-microsoft-com:office:powerpoint" xmlns:v="urn:schemas-microsoft-com:vml" xmlns:o="urn:schemas-microsoft-com:office:office" xmlns:dgm="http://schemas.openxmlformats.org/drawingml/2006/diagram" xmlns:c="http://schemas.openxmlformats.org/drawingml/2006/chart" xmlns:mv="urn:schemas-microsoft-com:mac:vml" xmlns="">
+    <mc:Fallback xmlns="" xmlns:mv="urn:schemas-microsoft-com:mac:vml" xmlns:c="http://schemas.openxmlformats.org/drawingml/2006/chart" xmlns:dgm="http://schemas.openxmlformats.org/drawingml/2006/diagram" xmlns:o="urn:schemas-microsoft-com:office:office" xmlns:v="urn:schemas-microsoft-com:vml" xmlns:pvml="urn:schemas-microsoft-com:office:powerpoint" xmlns:com="http://schemas.openxmlformats.org/drawingml/2006/compatibility" xmlns:p15="http://schemas.microsoft.com/office/powerpoint/2012/main" xmlns:ahyp="http://schemas.microsoft.com/office/drawing/2018/hyperlinkcolor">
       <p:transition spd="slow">
         <p:fade/>
       </p:transition>
@@ -17750,7 +18064,7 @@
         <p:fade/>
       </p:transition>
     </mc:Choice>
-    <mc:Fallback xmlns:ahyp="http://schemas.microsoft.com/office/drawing/2018/hyperlinkcolor" xmlns:p15="http://schemas.microsoft.com/office/powerpoint/2012/main" xmlns:com="http://schemas.openxmlformats.org/drawingml/2006/compatibility" xmlns:pvml="urn:schemas-microsoft-com:office:powerpoint" xmlns:v="urn:schemas-microsoft-com:vml" xmlns:o="urn:schemas-microsoft-com:office:office" xmlns:dgm="http://schemas.openxmlformats.org/drawingml/2006/diagram" xmlns:c="http://schemas.openxmlformats.org/drawingml/2006/chart" xmlns:mv="urn:schemas-microsoft-com:mac:vml" xmlns="">
+    <mc:Fallback xmlns="" xmlns:mv="urn:schemas-microsoft-com:mac:vml" xmlns:c="http://schemas.openxmlformats.org/drawingml/2006/chart" xmlns:dgm="http://schemas.openxmlformats.org/drawingml/2006/diagram" xmlns:o="urn:schemas-microsoft-com:office:office" xmlns:v="urn:schemas-microsoft-com:vml" xmlns:pvml="urn:schemas-microsoft-com:office:powerpoint" xmlns:com="http://schemas.openxmlformats.org/drawingml/2006/compatibility" xmlns:p15="http://schemas.microsoft.com/office/powerpoint/2012/main" xmlns:ahyp="http://schemas.microsoft.com/office/drawing/2018/hyperlinkcolor">
       <p:transition spd="slow">
         <p:fade/>
       </p:transition>
@@ -18044,7 +18358,7 @@
         <p:fade/>
       </p:transition>
     </mc:Choice>
-    <mc:Fallback xmlns:ahyp="http://schemas.microsoft.com/office/drawing/2018/hyperlinkcolor" xmlns:p15="http://schemas.microsoft.com/office/powerpoint/2012/main" xmlns:com="http://schemas.openxmlformats.org/drawingml/2006/compatibility" xmlns:pvml="urn:schemas-microsoft-com:office:powerpoint" xmlns:v="urn:schemas-microsoft-com:vml" xmlns:o="urn:schemas-microsoft-com:office:office" xmlns:dgm="http://schemas.openxmlformats.org/drawingml/2006/diagram" xmlns:c="http://schemas.openxmlformats.org/drawingml/2006/chart" xmlns:mv="urn:schemas-microsoft-com:mac:vml" xmlns="">
+    <mc:Fallback xmlns="" xmlns:mv="urn:schemas-microsoft-com:mac:vml" xmlns:c="http://schemas.openxmlformats.org/drawingml/2006/chart" xmlns:dgm="http://schemas.openxmlformats.org/drawingml/2006/diagram" xmlns:o="urn:schemas-microsoft-com:office:office" xmlns:v="urn:schemas-microsoft-com:vml" xmlns:pvml="urn:schemas-microsoft-com:office:powerpoint" xmlns:com="http://schemas.openxmlformats.org/drawingml/2006/compatibility" xmlns:p15="http://schemas.microsoft.com/office/powerpoint/2012/main" xmlns:ahyp="http://schemas.microsoft.com/office/drawing/2018/hyperlinkcolor">
       <p:transition spd="slow">
         <p:fade/>
       </p:transition>
@@ -18282,7 +18596,7 @@
         <p:fade/>
       </p:transition>
     </mc:Choice>
-    <mc:Fallback xmlns:ahyp="http://schemas.microsoft.com/office/drawing/2018/hyperlinkcolor" xmlns:p15="http://schemas.microsoft.com/office/powerpoint/2012/main" xmlns:com="http://schemas.openxmlformats.org/drawingml/2006/compatibility" xmlns:pvml="urn:schemas-microsoft-com:office:powerpoint" xmlns:v="urn:schemas-microsoft-com:vml" xmlns:o="urn:schemas-microsoft-com:office:office" xmlns:dgm="http://schemas.openxmlformats.org/drawingml/2006/diagram" xmlns:c="http://schemas.openxmlformats.org/drawingml/2006/chart" xmlns:mv="urn:schemas-microsoft-com:mac:vml" xmlns="">
+    <mc:Fallback xmlns="" xmlns:mv="urn:schemas-microsoft-com:mac:vml" xmlns:c="http://schemas.openxmlformats.org/drawingml/2006/chart" xmlns:dgm="http://schemas.openxmlformats.org/drawingml/2006/diagram" xmlns:o="urn:schemas-microsoft-com:office:office" xmlns:v="urn:schemas-microsoft-com:vml" xmlns:pvml="urn:schemas-microsoft-com:office:powerpoint" xmlns:com="http://schemas.openxmlformats.org/drawingml/2006/compatibility" xmlns:p15="http://schemas.microsoft.com/office/powerpoint/2012/main" xmlns:ahyp="http://schemas.microsoft.com/office/drawing/2018/hyperlinkcolor">
       <p:transition spd="slow">
         <p:fade/>
       </p:transition>
@@ -18517,7 +18831,7 @@
         <p:fade/>
       </p:transition>
     </mc:Choice>
-    <mc:Fallback xmlns:ahyp="http://schemas.microsoft.com/office/drawing/2018/hyperlinkcolor" xmlns:p15="http://schemas.microsoft.com/office/powerpoint/2012/main" xmlns:com="http://schemas.openxmlformats.org/drawingml/2006/compatibility" xmlns:pvml="urn:schemas-microsoft-com:office:powerpoint" xmlns:v="urn:schemas-microsoft-com:vml" xmlns:o="urn:schemas-microsoft-com:office:office" xmlns:dgm="http://schemas.openxmlformats.org/drawingml/2006/diagram" xmlns:c="http://schemas.openxmlformats.org/drawingml/2006/chart" xmlns:mv="urn:schemas-microsoft-com:mac:vml" xmlns="">
+    <mc:Fallback xmlns="" xmlns:mv="urn:schemas-microsoft-com:mac:vml" xmlns:c="http://schemas.openxmlformats.org/drawingml/2006/chart" xmlns:dgm="http://schemas.openxmlformats.org/drawingml/2006/diagram" xmlns:o="urn:schemas-microsoft-com:office:office" xmlns:v="urn:schemas-microsoft-com:vml" xmlns:pvml="urn:schemas-microsoft-com:office:powerpoint" xmlns:com="http://schemas.openxmlformats.org/drawingml/2006/compatibility" xmlns:p15="http://schemas.microsoft.com/office/powerpoint/2012/main" xmlns:ahyp="http://schemas.microsoft.com/office/drawing/2018/hyperlinkcolor">
       <p:transition spd="slow">
         <p:fade/>
       </p:transition>

</xml_diff>